<commit_message>
Started lab, wrote file_io lecture
</commit_message>
<xml_diff>
--- a/lessons/instrument_control/lesson1/lesson1.pptx
+++ b/lessons/instrument_control/lesson1/lesson1.pptx
@@ -4275,7 +4275,7 @@
             </a:pPr>
             <a:r>
               <a:rPr lang="en-US" sz="2800" dirty="0"/>
-              <a:t>First week</a:t>
+              <a:t> First week</a:t>
             </a:r>
           </a:p>
           <a:p>
@@ -4301,15 +4301,7 @@
             </a:pPr>
             <a:r>
               <a:rPr lang="en-US" sz="2600" dirty="0"/>
-              <a:t>Wed/</a:t>
-            </a:r>
-            <a:r>
-              <a:rPr lang="en-US" sz="2600" dirty="0" err="1"/>
-              <a:t>Thur</a:t>
-            </a:r>
-            <a:r>
-              <a:rPr lang="en-US" sz="2600" dirty="0"/>
-              <a:t>/Fri: Fourier transform properties and sampling </a:t>
+              <a:t>Wed/Thu/Fri: Fourier transform properties and sampling </a:t>
             </a:r>
           </a:p>
           <a:p>
@@ -4348,15 +4340,7 @@
             </a:pPr>
             <a:r>
               <a:rPr lang="en-US" sz="2600" dirty="0"/>
-              <a:t>Wed/</a:t>
-            </a:r>
-            <a:r>
-              <a:rPr lang="en-US" sz="2600" dirty="0" err="1"/>
-              <a:t>Thur</a:t>
-            </a:r>
-            <a:r>
-              <a:rPr lang="en-US" sz="2600" dirty="0"/>
-              <a:t>: lab project (with electronics)</a:t>
+              <a:t>Wed/Thu: lab project (with electronics)</a:t>
             </a:r>
           </a:p>
         </p:txBody>

</xml_diff>

<commit_message>
added files and links to lectures
</commit_message>
<xml_diff>
--- a/lessons/instrument_control/lesson1/lesson1.pptx
+++ b/lessons/instrument_control/lesson1/lesson1.pptx
@@ -4275,7 +4275,7 @@
             </a:pPr>
             <a:r>
               <a:rPr lang="en-US" sz="2800" dirty="0"/>
-              <a:t> First week</a:t>
+              <a:t>First week</a:t>
             </a:r>
           </a:p>
           <a:p>
@@ -4301,7 +4301,15 @@
             </a:pPr>
             <a:r>
               <a:rPr lang="en-US" sz="2600" dirty="0"/>
-              <a:t>Wed/Thu/Fri: Fourier transform properties and sampling </a:t>
+              <a:t>Wed/</a:t>
+            </a:r>
+            <a:r>
+              <a:rPr lang="en-US" sz="2600" dirty="0" err="1"/>
+              <a:t>Thur</a:t>
+            </a:r>
+            <a:r>
+              <a:rPr lang="en-US" sz="2600" dirty="0"/>
+              <a:t>/Fri: Fourier transform properties and sampling </a:t>
             </a:r>
           </a:p>
           <a:p>
@@ -4340,7 +4348,15 @@
             </a:pPr>
             <a:r>
               <a:rPr lang="en-US" sz="2600" dirty="0"/>
-              <a:t>Wed/Thu: lab project (with electronics)</a:t>
+              <a:t>Wed/</a:t>
+            </a:r>
+            <a:r>
+              <a:rPr lang="en-US" sz="2600" dirty="0" err="1"/>
+              <a:t>Thur</a:t>
+            </a:r>
+            <a:r>
+              <a:rPr lang="en-US" sz="2600" dirty="0"/>
+              <a:t>: lab project (with electronics)</a:t>
             </a:r>
           </a:p>
         </p:txBody>

</xml_diff>